<commit_message>
sotiris office hour update
</commit_message>
<xml_diff>
--- a/fall2016/lectures/3-Integrity-PRF.pptx
+++ b/fall2016/lectures/3-Integrity-PRF.pptx
@@ -12832,7 +12832,7 @@
                 <a:graphicData uri="http://schemas.openxmlformats.org/presentationml/2006/ole">
                   <mc:AlternateContent xmlns:mc="http://schemas.openxmlformats.org/markup-compatibility/2006">
                     <mc:Choice xmlns:v="urn:schemas-microsoft-com:vml" Requires="v">
-                      <p:oleObj spid="_x0000_s1030" name="Equation" r:id="rId4" imgW="2527200" imgH="380880" progId="Equation.3">
+                      <p:oleObj spid="_x0000_s1032" name="Equation" r:id="rId4" imgW="2527200" imgH="380880" progId="Equation.3">
                         <p:embed/>
                       </p:oleObj>
                     </mc:Choice>
@@ -22264,7 +22264,9 @@
           </a:xfrm>
         </p:spPr>
         <p:txBody>
-          <a:bodyPr/>
+          <a:bodyPr>
+            <a:normAutofit fontScale="92500"/>
+          </a:bodyPr>
           <a:lstStyle/>
           <a:p>
             <a:pPr marL="0" indent="0">
@@ -22482,7 +22484,7 @@
         <p:spPr/>
         <p:txBody>
           <a:bodyPr>
-            <a:normAutofit/>
+            <a:normAutofit fontScale="90000"/>
           </a:bodyPr>
           <a:lstStyle/>
           <a:p>

</xml_diff>